<commit_message>
made dot plots for o157 and diversity tables for manuscript
</commit_message>
<xml_diff>
--- a/plots/abundance figure.pptx
+++ b/plots/abundance figure.pptx
@@ -5,7 +5,7 @@
     <p:sldMasterId id="2147483648" r:id="rId1"/>
   </p:sldMasterIdLst>
   <p:notesMasterIdLst>
-    <p:notesMasterId r:id="rId10"/>
+    <p:notesMasterId r:id="rId11"/>
   </p:notesMasterIdLst>
   <p:sldIdLst>
     <p:sldId id="256" r:id="rId2"/>
@@ -16,6 +16,7 @@
     <p:sldId id="259" r:id="rId7"/>
     <p:sldId id="260" r:id="rId8"/>
     <p:sldId id="261" r:id="rId9"/>
+    <p:sldId id="265" r:id="rId10"/>
   </p:sldIdLst>
   <p:sldSz cx="9144000" cy="6858000" type="screen4x3"/>
   <p:notesSz cx="6858000" cy="9144000"/>
@@ -199,7 +200,7 @@
           <a:p>
             <a:fld id="{01F7545B-EEDA-D14A-AC7C-E4C26296CE48}" type="datetimeFigureOut">
               <a:rPr lang="en-US" smtClean="0"/>
-              <a:t>6/26/17</a:t>
+              <a:t>6/29/17</a:t>
             </a:fld>
             <a:endParaRPr lang="en-US"/>
           </a:p>
@@ -851,7 +852,7 @@
           <a:p>
             <a:fld id="{446C48F4-478A-AD4E-B893-C78327622D8B}" type="datetimeFigureOut">
               <a:rPr lang="en-US" smtClean="0"/>
-              <a:t>6/26/17</a:t>
+              <a:t>6/29/17</a:t>
             </a:fld>
             <a:endParaRPr lang="en-US"/>
           </a:p>
@@ -1021,7 +1022,7 @@
           <a:p>
             <a:fld id="{446C48F4-478A-AD4E-B893-C78327622D8B}" type="datetimeFigureOut">
               <a:rPr lang="en-US" smtClean="0"/>
-              <a:t>6/26/17</a:t>
+              <a:t>6/29/17</a:t>
             </a:fld>
             <a:endParaRPr lang="en-US"/>
           </a:p>
@@ -1201,7 +1202,7 @@
           <a:p>
             <a:fld id="{446C48F4-478A-AD4E-B893-C78327622D8B}" type="datetimeFigureOut">
               <a:rPr lang="en-US" smtClean="0"/>
-              <a:t>6/26/17</a:t>
+              <a:t>6/29/17</a:t>
             </a:fld>
             <a:endParaRPr lang="en-US"/>
           </a:p>
@@ -1371,7 +1372,7 @@
           <a:p>
             <a:fld id="{446C48F4-478A-AD4E-B893-C78327622D8B}" type="datetimeFigureOut">
               <a:rPr lang="en-US" smtClean="0"/>
-              <a:t>6/26/17</a:t>
+              <a:t>6/29/17</a:t>
             </a:fld>
             <a:endParaRPr lang="en-US"/>
           </a:p>
@@ -1617,7 +1618,7 @@
           <a:p>
             <a:fld id="{446C48F4-478A-AD4E-B893-C78327622D8B}" type="datetimeFigureOut">
               <a:rPr lang="en-US" smtClean="0"/>
-              <a:t>6/26/17</a:t>
+              <a:t>6/29/17</a:t>
             </a:fld>
             <a:endParaRPr lang="en-US"/>
           </a:p>
@@ -1905,7 +1906,7 @@
           <a:p>
             <a:fld id="{446C48F4-478A-AD4E-B893-C78327622D8B}" type="datetimeFigureOut">
               <a:rPr lang="en-US" smtClean="0"/>
-              <a:t>6/26/17</a:t>
+              <a:t>6/29/17</a:t>
             </a:fld>
             <a:endParaRPr lang="en-US"/>
           </a:p>
@@ -2327,7 +2328,7 @@
           <a:p>
             <a:fld id="{446C48F4-478A-AD4E-B893-C78327622D8B}" type="datetimeFigureOut">
               <a:rPr lang="en-US" smtClean="0"/>
-              <a:t>6/26/17</a:t>
+              <a:t>6/29/17</a:t>
             </a:fld>
             <a:endParaRPr lang="en-US"/>
           </a:p>
@@ -2445,7 +2446,7 @@
           <a:p>
             <a:fld id="{446C48F4-478A-AD4E-B893-C78327622D8B}" type="datetimeFigureOut">
               <a:rPr lang="en-US" smtClean="0"/>
-              <a:t>6/26/17</a:t>
+              <a:t>6/29/17</a:t>
             </a:fld>
             <a:endParaRPr lang="en-US"/>
           </a:p>
@@ -2540,7 +2541,7 @@
           <a:p>
             <a:fld id="{446C48F4-478A-AD4E-B893-C78327622D8B}" type="datetimeFigureOut">
               <a:rPr lang="en-US" smtClean="0"/>
-              <a:t>6/26/17</a:t>
+              <a:t>6/29/17</a:t>
             </a:fld>
             <a:endParaRPr lang="en-US"/>
           </a:p>
@@ -2817,7 +2818,7 @@
           <a:p>
             <a:fld id="{446C48F4-478A-AD4E-B893-C78327622D8B}" type="datetimeFigureOut">
               <a:rPr lang="en-US" smtClean="0"/>
-              <a:t>6/26/17</a:t>
+              <a:t>6/29/17</a:t>
             </a:fld>
             <a:endParaRPr lang="en-US"/>
           </a:p>
@@ -3070,7 +3071,7 @@
           <a:p>
             <a:fld id="{446C48F4-478A-AD4E-B893-C78327622D8B}" type="datetimeFigureOut">
               <a:rPr lang="en-US" smtClean="0"/>
-              <a:t>6/26/17</a:t>
+              <a:t>6/29/17</a:t>
             </a:fld>
             <a:endParaRPr lang="en-US"/>
           </a:p>
@@ -3283,7 +3284,7 @@
           <a:p>
             <a:fld id="{446C48F4-478A-AD4E-B893-C78327622D8B}" type="datetimeFigureOut">
               <a:rPr lang="en-US" smtClean="0"/>
-              <a:t>6/26/17</a:t>
+              <a:t>6/29/17</a:t>
             </a:fld>
             <a:endParaRPr lang="en-US"/>
           </a:p>
@@ -3742,11 +3743,7 @@
               <a:p>
                 <a:r>
                   <a:rPr lang="en-US" dirty="0" smtClean="0"/>
-                  <a:t>Fa</a:t>
-                </a:r>
-                <a:r>
-                  <a:rPr lang="en-US" dirty="0" smtClean="0"/>
-                  <a:t>mily</a:t>
+                  <a:t>Family</a:t>
                 </a:r>
                 <a:endParaRPr lang="en-US" dirty="0"/>
               </a:p>
@@ -4055,11 +4052,7 @@
               <a:p>
                 <a:r>
                   <a:rPr lang="en-US" dirty="0" smtClean="0"/>
-                  <a:t>Fa</a:t>
-                </a:r>
-                <a:r>
-                  <a:rPr lang="en-US" dirty="0" smtClean="0"/>
-                  <a:t>mily</a:t>
+                  <a:t>Family</a:t>
                 </a:r>
                 <a:endParaRPr lang="en-US" dirty="0"/>
               </a:p>
@@ -5713,11 +5706,7 @@
             <a:p>
               <a:r>
                 <a:rPr lang="en-US" dirty="0" smtClean="0"/>
-                <a:t>Fa</a:t>
-              </a:r>
-              <a:r>
-                <a:rPr lang="en-US" dirty="0" smtClean="0"/>
-                <a:t>mily</a:t>
+                <a:t>Family</a:t>
               </a:r>
               <a:endParaRPr lang="en-US" dirty="0"/>
             </a:p>
@@ -6299,11 +6288,7 @@
             <a:p>
               <a:r>
                 <a:rPr lang="en-US" sz="1000" dirty="0" smtClean="0"/>
-                <a:t>Fa</a:t>
-              </a:r>
-              <a:r>
-                <a:rPr lang="en-US" sz="1000" dirty="0" smtClean="0"/>
-                <a:t>mily</a:t>
+                <a:t>Family</a:t>
               </a:r>
               <a:endParaRPr lang="en-US" sz="1000" dirty="0"/>
             </a:p>
@@ -6394,11 +6379,7 @@
               <a:p>
                 <a:r>
                   <a:rPr lang="en-US" sz="1000" dirty="0" smtClean="0"/>
-                  <a:t>Fa</a:t>
-                </a:r>
-                <a:r>
-                  <a:rPr lang="en-US" sz="1000" dirty="0" smtClean="0"/>
-                  <a:t>mily</a:t>
+                  <a:t>Family</a:t>
                 </a:r>
                 <a:endParaRPr lang="en-US" sz="1000" dirty="0"/>
               </a:p>
@@ -7115,11 +7096,7 @@
               <a:p>
                 <a:r>
                   <a:rPr lang="en-US" sz="1000" dirty="0" smtClean="0"/>
-                  <a:t>Fa</a:t>
-                </a:r>
-                <a:r>
-                  <a:rPr lang="en-US" sz="1000" dirty="0" smtClean="0"/>
-                  <a:t>mily</a:t>
+                  <a:t>Family</a:t>
                 </a:r>
                 <a:endParaRPr lang="en-US" sz="1000" dirty="0"/>
               </a:p>
@@ -7848,7 +7825,6 @@
                 <a:rPr lang="en-US" sz="1000" b="1" dirty="0"/>
                 <a:t>A</a:t>
               </a:r>
-              <a:endParaRPr lang="en-US" sz="1000" b="1" dirty="0"/>
             </a:p>
           </p:txBody>
         </p:sp>
@@ -7878,7 +7854,6 @@
                 <a:rPr lang="en-US" sz="1000" b="1" dirty="0"/>
                 <a:t>B</a:t>
               </a:r>
-              <a:endParaRPr lang="en-US" sz="1000" b="1" dirty="0"/>
             </a:p>
           </p:txBody>
         </p:sp>
@@ -7908,7 +7883,6 @@
                 <a:rPr lang="en-US" sz="1000" b="1" dirty="0"/>
                 <a:t>C</a:t>
               </a:r>
-              <a:endParaRPr lang="en-US" sz="1000" b="1" dirty="0"/>
             </a:p>
           </p:txBody>
         </p:sp>
@@ -7938,7 +7912,6 @@
                 <a:rPr lang="en-US" sz="1000" b="1" dirty="0"/>
                 <a:t>D</a:t>
               </a:r>
-              <a:endParaRPr lang="en-US" sz="1000" b="1" dirty="0"/>
             </a:p>
           </p:txBody>
         </p:sp>
@@ -8003,6 +7976,191 @@
     <p:extLst>
       <p:ext uri="{BB962C8B-B14F-4D97-AF65-F5344CB8AC3E}">
         <p14:creationId xmlns:p14="http://schemas.microsoft.com/office/powerpoint/2010/main" val="2335501191"/>
+      </p:ext>
+    </p:extLst>
+  </p:cSld>
+  <p:clrMapOvr>
+    <a:masterClrMapping/>
+  </p:clrMapOvr>
+</p:sld>
+</file>
+
+<file path=ppt/slides/slide9.xml><?xml version="1.0" encoding="utf-8"?>
+<p:sld xmlns:a="http://schemas.openxmlformats.org/drawingml/2006/main" xmlns:r="http://schemas.openxmlformats.org/officeDocument/2006/relationships" xmlns:p="http://schemas.openxmlformats.org/presentationml/2006/main">
+  <p:cSld>
+    <p:spTree>
+      <p:nvGrpSpPr>
+        <p:cNvPr id="1" name=""/>
+        <p:cNvGrpSpPr/>
+        <p:nvPr/>
+      </p:nvGrpSpPr>
+      <p:grpSpPr>
+        <a:xfrm>
+          <a:off x="0" y="0"/>
+          <a:ext cx="0" cy="0"/>
+          <a:chOff x="0" y="0"/>
+          <a:chExt cx="0" cy="0"/>
+        </a:xfrm>
+      </p:grpSpPr>
+      <p:grpSp>
+        <p:nvGrpSpPr>
+          <p:cNvPr id="8" name="Group 7"/>
+          <p:cNvGrpSpPr/>
+          <p:nvPr/>
+        </p:nvGrpSpPr>
+        <p:grpSpPr>
+          <a:xfrm>
+            <a:off x="1691201" y="147820"/>
+            <a:ext cx="4696612" cy="5760017"/>
+            <a:chOff x="1691201" y="147820"/>
+            <a:chExt cx="4696612" cy="5760017"/>
+          </a:xfrm>
+        </p:grpSpPr>
+        <p:grpSp>
+          <p:nvGrpSpPr>
+            <p:cNvPr id="4" name="Group 3"/>
+            <p:cNvGrpSpPr/>
+            <p:nvPr/>
+          </p:nvGrpSpPr>
+          <p:grpSpPr>
+            <a:xfrm>
+              <a:off x="1828800" y="185920"/>
+              <a:ext cx="4559013" cy="5721917"/>
+              <a:chOff x="1828800" y="185920"/>
+              <a:chExt cx="4559013" cy="5721917"/>
+            </a:xfrm>
+          </p:grpSpPr>
+          <p:pic>
+            <p:nvPicPr>
+              <p:cNvPr id="2" name="Picture 1"/>
+              <p:cNvPicPr/>
+              <p:nvPr/>
+            </p:nvPicPr>
+            <p:blipFill>
+              <a:blip r:embed="rId2">
+                <a:extLst>
+                  <a:ext uri="{28A0092B-C50C-407E-A947-70E740481C1C}">
+                    <a14:useLocalDpi xmlns:a14="http://schemas.microsoft.com/office/drawing/2010/main" val="0"/>
+                  </a:ext>
+                </a:extLst>
+              </a:blip>
+              <a:srcRect/>
+              <a:stretch>
+                <a:fillRect/>
+              </a:stretch>
+            </p:blipFill>
+            <p:spPr bwMode="auto">
+              <a:xfrm>
+                <a:off x="1828800" y="185920"/>
+                <a:ext cx="4559013" cy="2950815"/>
+              </a:xfrm>
+              <a:prstGeom prst="rect">
+                <a:avLst/>
+              </a:prstGeom>
+              <a:noFill/>
+              <a:ln>
+                <a:noFill/>
+              </a:ln>
+            </p:spPr>
+          </p:pic>
+          <p:pic>
+            <p:nvPicPr>
+              <p:cNvPr id="3" name="Picture 2"/>
+              <p:cNvPicPr/>
+              <p:nvPr/>
+            </p:nvPicPr>
+            <p:blipFill>
+              <a:blip r:embed="rId3">
+                <a:extLst>
+                  <a:ext uri="{28A0092B-C50C-407E-A947-70E740481C1C}">
+                    <a14:useLocalDpi xmlns:a14="http://schemas.microsoft.com/office/drawing/2010/main" val="0"/>
+                  </a:ext>
+                </a:extLst>
+              </a:blip>
+              <a:srcRect/>
+              <a:stretch>
+                <a:fillRect/>
+              </a:stretch>
+            </p:blipFill>
+            <p:spPr bwMode="auto">
+              <a:xfrm>
+                <a:off x="1828800" y="3120496"/>
+                <a:ext cx="4559013" cy="2787341"/>
+              </a:xfrm>
+              <a:prstGeom prst="rect">
+                <a:avLst/>
+              </a:prstGeom>
+              <a:noFill/>
+              <a:ln>
+                <a:noFill/>
+              </a:ln>
+            </p:spPr>
+          </p:pic>
+        </p:grpSp>
+        <p:sp>
+          <p:nvSpPr>
+            <p:cNvPr id="5" name="TextBox 4"/>
+            <p:cNvSpPr txBox="1"/>
+            <p:nvPr/>
+          </p:nvSpPr>
+          <p:spPr>
+            <a:xfrm>
+              <a:off x="1691201" y="147820"/>
+              <a:ext cx="275198" cy="246221"/>
+            </a:xfrm>
+            <a:prstGeom prst="rect">
+              <a:avLst/>
+            </a:prstGeom>
+            <a:noFill/>
+          </p:spPr>
+          <p:txBody>
+            <a:bodyPr wrap="none" rtlCol="0">
+              <a:spAutoFit/>
+            </a:bodyPr>
+            <a:lstStyle/>
+            <a:p>
+              <a:r>
+                <a:rPr lang="en-US" sz="1000" b="1" dirty="0"/>
+                <a:t>A</a:t>
+              </a:r>
+            </a:p>
+          </p:txBody>
+        </p:sp>
+        <p:sp>
+          <p:nvSpPr>
+            <p:cNvPr id="7" name="TextBox 6"/>
+            <p:cNvSpPr txBox="1"/>
+            <p:nvPr/>
+          </p:nvSpPr>
+          <p:spPr>
+            <a:xfrm>
+              <a:off x="1691201" y="3069881"/>
+              <a:ext cx="256551" cy="246221"/>
+            </a:xfrm>
+            <a:prstGeom prst="rect">
+              <a:avLst/>
+            </a:prstGeom>
+            <a:noFill/>
+          </p:spPr>
+          <p:txBody>
+            <a:bodyPr wrap="none" rtlCol="0">
+              <a:spAutoFit/>
+            </a:bodyPr>
+            <a:lstStyle/>
+            <a:p>
+              <a:r>
+                <a:rPr lang="en-US" sz="1000" b="1" dirty="0"/>
+                <a:t>B</a:t>
+              </a:r>
+              <a:endParaRPr lang="en-US" sz="1000" b="1" dirty="0"/>
+            </a:p>
+          </p:txBody>
+        </p:sp>
+      </p:grpSp>
+    </p:spTree>
+    <p:extLst>
+      <p:ext uri="{BB962C8B-B14F-4D97-AF65-F5344CB8AC3E}">
+        <p14:creationId xmlns:p14="http://schemas.microsoft.com/office/powerpoint/2010/main" val="4265396702"/>
       </p:ext>
     </p:extLst>
   </p:cSld>

</xml_diff>